<commit_message>
added comments to code and did changes before submitting assignments
</commit_message>
<xml_diff>
--- a/Comparing the national average download and upload speeds.pptx
+++ b/Comparing the national average download and upload speeds.pptx
@@ -124,8 +124,110 @@
         </p14:section>
       </p14:sectionLst>
     </p:ext>
+    <p:ext uri="{EFAFB233-063F-42B5-8137-9DF3F51BA10A}">
+      <p15:sldGuideLst xmlns:p15="http://schemas.microsoft.com/office/powerpoint/2012/main"/>
+    </p:ext>
   </p:extLst>
 </p:presentation>
+</file>
+
+<file path=ppt/revisionInfo.xml><?xml version="1.0" encoding="utf-8"?>
+<p1510:revInfo xmlns:a="http://schemas.openxmlformats.org/drawingml/2006/main" xmlns:r="http://schemas.openxmlformats.org/officeDocument/2006/relationships" xmlns:p1510="http://schemas.microsoft.com/office/powerpoint/2015/10/main">
+  <p1510:revLst>
+    <p1510:client id="{8225ED6F-7698-4BF3-ADC2-1319433351F7}" v="45" dt="2024-10-31T10:10:55.125"/>
+  </p1510:revLst>
+</p1510:revInfo>
+</file>
+
+<file path=ppt/changesInfos/changesInfo1.xml><?xml version="1.0" encoding="utf-8"?>
+<pc:chgInfo xmlns:a="http://schemas.openxmlformats.org/drawingml/2006/main" xmlns:r="http://schemas.openxmlformats.org/officeDocument/2006/relationships" xmlns:ac="http://schemas.microsoft.com/office/drawing/2013/main/command" xmlns:pc="http://schemas.microsoft.com/office/powerpoint/2013/main/command">
+  <pc:docChgLst>
+    <pc:chgData name="Hassan Naik" userId="ace4519e2b67b11f" providerId="LiveId" clId="{8225ED6F-7698-4BF3-ADC2-1319433351F7}"/>
+    <pc:docChg chg="custSel modSld">
+      <pc:chgData name="Hassan Naik" userId="ace4519e2b67b11f" providerId="LiveId" clId="{8225ED6F-7698-4BF3-ADC2-1319433351F7}" dt="2024-10-31T10:18:28.181" v="472" actId="404"/>
+      <pc:docMkLst>
+        <pc:docMk/>
+      </pc:docMkLst>
+      <pc:sldChg chg="modSp mod">
+        <pc:chgData name="Hassan Naik" userId="ace4519e2b67b11f" providerId="LiveId" clId="{8225ED6F-7698-4BF3-ADC2-1319433351F7}" dt="2024-10-31T10:15:00.805" v="286" actId="20577"/>
+        <pc:sldMkLst>
+          <pc:docMk/>
+          <pc:sldMk cId="2544487874" sldId="260"/>
+        </pc:sldMkLst>
+        <pc:spChg chg="mod">
+          <ac:chgData name="Hassan Naik" userId="ace4519e2b67b11f" providerId="LiveId" clId="{8225ED6F-7698-4BF3-ADC2-1319433351F7}" dt="2024-10-31T10:15:00.805" v="286" actId="20577"/>
+          <ac:spMkLst>
+            <pc:docMk/>
+            <pc:sldMk cId="2544487874" sldId="260"/>
+            <ac:spMk id="2" creationId="{4CD495DA-69BB-5E40-8340-810CE219BE66}"/>
+          </ac:spMkLst>
+        </pc:spChg>
+      </pc:sldChg>
+      <pc:sldChg chg="modSp mod">
+        <pc:chgData name="Hassan Naik" userId="ace4519e2b67b11f" providerId="LiveId" clId="{8225ED6F-7698-4BF3-ADC2-1319433351F7}" dt="2024-10-31T10:18:28.181" v="472" actId="404"/>
+        <pc:sldMkLst>
+          <pc:docMk/>
+          <pc:sldMk cId="1578460402" sldId="261"/>
+        </pc:sldMkLst>
+        <pc:spChg chg="mod">
+          <ac:chgData name="Hassan Naik" userId="ace4519e2b67b11f" providerId="LiveId" clId="{8225ED6F-7698-4BF3-ADC2-1319433351F7}" dt="2024-10-31T10:18:28.181" v="472" actId="404"/>
+          <ac:spMkLst>
+            <pc:docMk/>
+            <pc:sldMk cId="1578460402" sldId="261"/>
+            <ac:spMk id="2" creationId="{1E40C164-918D-049C-39B8-E1348AFE3C6A}"/>
+          </ac:spMkLst>
+        </pc:spChg>
+      </pc:sldChg>
+      <pc:sldChg chg="addSp delSp modSp mod">
+        <pc:chgData name="Hassan Naik" userId="ace4519e2b67b11f" providerId="LiveId" clId="{8225ED6F-7698-4BF3-ADC2-1319433351F7}" dt="2024-10-31T10:10:55.125" v="117"/>
+        <pc:sldMkLst>
+          <pc:docMk/>
+          <pc:sldMk cId="2051520857" sldId="263"/>
+        </pc:sldMkLst>
+        <pc:graphicFrameChg chg="mod modGraphic">
+          <ac:chgData name="Hassan Naik" userId="ace4519e2b67b11f" providerId="LiveId" clId="{8225ED6F-7698-4BF3-ADC2-1319433351F7}" dt="2024-10-31T10:04:12.354" v="4"/>
+          <ac:graphicFrameMkLst>
+            <pc:docMk/>
+            <pc:sldMk cId="2051520857" sldId="263"/>
+            <ac:graphicFrameMk id="4" creationId="{B3428895-CF28-5437-CD23-2F80AF470006}"/>
+          </ac:graphicFrameMkLst>
+        </pc:graphicFrameChg>
+        <pc:graphicFrameChg chg="add del mod">
+          <ac:chgData name="Hassan Naik" userId="ace4519e2b67b11f" providerId="LiveId" clId="{8225ED6F-7698-4BF3-ADC2-1319433351F7}" dt="2024-10-31T10:08:08.537" v="53" actId="478"/>
+          <ac:graphicFrameMkLst>
+            <pc:docMk/>
+            <pc:sldMk cId="2051520857" sldId="263"/>
+            <ac:graphicFrameMk id="5" creationId="{C1C7F802-C81F-BD95-A070-93C2AA213F1B}"/>
+          </ac:graphicFrameMkLst>
+        </pc:graphicFrameChg>
+        <pc:graphicFrameChg chg="mod">
+          <ac:chgData name="Hassan Naik" userId="ace4519e2b67b11f" providerId="LiveId" clId="{8225ED6F-7698-4BF3-ADC2-1319433351F7}" dt="2024-10-31T10:10:55.125" v="117"/>
+          <ac:graphicFrameMkLst>
+            <pc:docMk/>
+            <pc:sldMk cId="2051520857" sldId="263"/>
+            <ac:graphicFrameMk id="7" creationId="{BB23B0C9-1060-3969-BB60-4B1F522AC730}"/>
+          </ac:graphicFrameMkLst>
+        </pc:graphicFrameChg>
+        <pc:graphicFrameChg chg="add del mod">
+          <ac:chgData name="Hassan Naik" userId="ace4519e2b67b11f" providerId="LiveId" clId="{8225ED6F-7698-4BF3-ADC2-1319433351F7}" dt="2024-10-31T10:08:07.775" v="52" actId="478"/>
+          <ac:graphicFrameMkLst>
+            <pc:docMk/>
+            <pc:sldMk cId="2051520857" sldId="263"/>
+            <ac:graphicFrameMk id="9" creationId="{A344C4DB-E235-A33D-C727-B0F3409B51BA}"/>
+          </ac:graphicFrameMkLst>
+        </pc:graphicFrameChg>
+        <pc:graphicFrameChg chg="add mod">
+          <ac:chgData name="Hassan Naik" userId="ace4519e2b67b11f" providerId="LiveId" clId="{8225ED6F-7698-4BF3-ADC2-1319433351F7}" dt="2024-10-31T10:10:47.261" v="115" actId="6549"/>
+          <ac:graphicFrameMkLst>
+            <pc:docMk/>
+            <pc:sldMk cId="2051520857" sldId="263"/>
+            <ac:graphicFrameMk id="10" creationId="{CCF4E268-3DAA-DA49-E311-8E67DCE4760D}"/>
+          </ac:graphicFrameMkLst>
+        </pc:graphicFrameChg>
+      </pc:sldChg>
+    </pc:docChg>
+  </pc:docChgLst>
+</pc:chgInfo>
 </file>
 
 <file path=ppt/charts/chart1.xml><?xml version="1.0" encoding="utf-8"?>
@@ -169,15 +271,1095 @@
             </a:pPr>
             <a:r>
               <a:rPr lang="en-GB" dirty="0"/>
-              <a:t>Bar Chart comparing </a:t>
-            </a:r>
-            <a:r>
-              <a:rPr lang="en-GB" dirty="0" err="1"/>
-              <a:t>avg</a:t>
-            </a:r>
+              <a:t>average download speeds</a:t>
+            </a:r>
+          </a:p>
+        </c:rich>
+      </c:tx>
+      <c:overlay val="0"/>
+      <c:spPr>
+        <a:noFill/>
+        <a:ln>
+          <a:noFill/>
+        </a:ln>
+        <a:effectLst/>
+      </c:spPr>
+      <c:txPr>
+        <a:bodyPr rot="0" spcFirstLastPara="1" vertOverflow="ellipsis" vert="horz" wrap="square" anchor="ctr" anchorCtr="1"/>
+        <a:lstStyle/>
+        <a:p>
+          <a:pPr>
+            <a:defRPr sz="2128" b="1" i="0" u="none" strike="noStrike" kern="1200" spc="100" baseline="0">
+              <a:solidFill>
+                <a:schemeClr val="lt1">
+                  <a:lumMod val="95000"/>
+                </a:schemeClr>
+              </a:solidFill>
+              <a:effectLst>
+                <a:outerShdw blurRad="50800" dist="38100" dir="5400000" algn="t" rotWithShape="0">
+                  <a:prstClr val="black">
+                    <a:alpha val="40000"/>
+                  </a:prstClr>
+                </a:outerShdw>
+              </a:effectLst>
+              <a:latin typeface="+mn-lt"/>
+              <a:ea typeface="+mn-ea"/>
+              <a:cs typeface="+mn-cs"/>
+            </a:defRPr>
+          </a:pPr>
+          <a:endParaRPr lang="en-US"/>
+        </a:p>
+      </c:txPr>
+    </c:title>
+    <c:autoTitleDeleted val="0"/>
+    <c:plotArea>
+      <c:layout>
+        <c:manualLayout>
+          <c:layoutTarget val="inner"/>
+          <c:xMode val="edge"/>
+          <c:yMode val="edge"/>
+          <c:x val="0.11566662303969995"/>
+          <c:y val="0.1149258664538714"/>
+          <c:w val="0.7704849226995889"/>
+          <c:h val="0.76748654235442038"/>
+        </c:manualLayout>
+      </c:layout>
+      <c:barChart>
+        <c:barDir val="col"/>
+        <c:grouping val="clustered"/>
+        <c:varyColors val="0"/>
+        <c:ser>
+          <c:idx val="0"/>
+          <c:order val="0"/>
+          <c:tx>
+            <c:strRef>
+              <c:f>Sheet1!$B$1</c:f>
+              <c:strCache>
+                <c:ptCount val="1"/>
+                <c:pt idx="0">
+                  <c:v>National avg</c:v>
+                </c:pt>
+              </c:strCache>
+            </c:strRef>
+          </c:tx>
+          <c:spPr>
+            <a:gradFill rotWithShape="1">
+              <a:gsLst>
+                <a:gs pos="0">
+                  <a:schemeClr val="accent1">
+                    <a:satMod val="103000"/>
+                    <a:lumMod val="102000"/>
+                    <a:tint val="94000"/>
+                  </a:schemeClr>
+                </a:gs>
+                <a:gs pos="50000">
+                  <a:schemeClr val="accent1">
+                    <a:satMod val="110000"/>
+                    <a:lumMod val="100000"/>
+                    <a:shade val="100000"/>
+                  </a:schemeClr>
+                </a:gs>
+                <a:gs pos="100000">
+                  <a:schemeClr val="accent1">
+                    <a:lumMod val="99000"/>
+                    <a:satMod val="120000"/>
+                    <a:shade val="78000"/>
+                  </a:schemeClr>
+                </a:gs>
+              </a:gsLst>
+              <a:lin ang="5400000" scaled="0"/>
+            </a:gradFill>
+            <a:ln>
+              <a:noFill/>
+            </a:ln>
+            <a:effectLst>
+              <a:outerShdw blurRad="57150" dist="19050" dir="5400000" algn="ctr" rotWithShape="0">
+                <a:srgbClr val="000000">
+                  <a:alpha val="63000"/>
+                </a:srgbClr>
+              </a:outerShdw>
+            </a:effectLst>
+          </c:spPr>
+          <c:invertIfNegative val="0"/>
+          <c:cat>
+            <c:strRef>
+              <c:extLst>
+                <c:ext xmlns:c15="http://schemas.microsoft.com/office/drawing/2012/chart" uri="{02D57815-91ED-43cb-92C2-25804820EDAC}">
+                  <c15:fullRef>
+                    <c15:sqref>Sheet1!$A$2:$A$5</c15:sqref>
+                  </c15:fullRef>
+                </c:ext>
+              </c:extLst>
+              <c:f>(Sheet1!$A$2,Sheet1!$A$4:$A$5)</c:f>
+              <c:strCache>
+                <c:ptCount val="1"/>
+                <c:pt idx="0">
+                  <c:v>download</c:v>
+                </c:pt>
+              </c:strCache>
+            </c:strRef>
+          </c:cat>
+          <c:val>
+            <c:numRef>
+              <c:extLst>
+                <c:ext xmlns:c15="http://schemas.microsoft.com/office/drawing/2012/chart" uri="{02D57815-91ED-43cb-92C2-25804820EDAC}">
+                  <c15:fullRef>
+                    <c15:sqref>Sheet1!$B$2:$B$5</c15:sqref>
+                  </c15:fullRef>
+                </c:ext>
+              </c:extLst>
+              <c:f>(Sheet1!$B$2,Sheet1!$B$4:$B$5)</c:f>
+              <c:numCache>
+                <c:formatCode>General</c:formatCode>
+                <c:ptCount val="3"/>
+                <c:pt idx="0">
+                  <c:v>73.209999999999994</c:v>
+                </c:pt>
+              </c:numCache>
+            </c:numRef>
+          </c:val>
+          <c:extLst>
+            <c:ext xmlns:c16="http://schemas.microsoft.com/office/drawing/2014/chart" uri="{C3380CC4-5D6E-409C-BE32-E72D297353CC}">
+              <c16:uniqueId val="{00000000-8915-407B-869A-25ED3E641BCF}"/>
+            </c:ext>
+          </c:extLst>
+        </c:ser>
+        <c:ser>
+          <c:idx val="1"/>
+          <c:order val="1"/>
+          <c:tx>
+            <c:strRef>
+              <c:f>Sheet1!$C$1</c:f>
+              <c:strCache>
+                <c:ptCount val="1"/>
+                <c:pt idx="0">
+                  <c:v>My avg</c:v>
+                </c:pt>
+              </c:strCache>
+            </c:strRef>
+          </c:tx>
+          <c:spPr>
+            <a:gradFill rotWithShape="1">
+              <a:gsLst>
+                <a:gs pos="0">
+                  <a:schemeClr val="accent2">
+                    <a:satMod val="103000"/>
+                    <a:lumMod val="102000"/>
+                    <a:tint val="94000"/>
+                  </a:schemeClr>
+                </a:gs>
+                <a:gs pos="50000">
+                  <a:schemeClr val="accent2">
+                    <a:satMod val="110000"/>
+                    <a:lumMod val="100000"/>
+                    <a:shade val="100000"/>
+                  </a:schemeClr>
+                </a:gs>
+                <a:gs pos="100000">
+                  <a:schemeClr val="accent2">
+                    <a:lumMod val="99000"/>
+                    <a:satMod val="120000"/>
+                    <a:shade val="78000"/>
+                  </a:schemeClr>
+                </a:gs>
+              </a:gsLst>
+              <a:lin ang="5400000" scaled="0"/>
+            </a:gradFill>
+            <a:ln>
+              <a:noFill/>
+            </a:ln>
+            <a:effectLst>
+              <a:outerShdw blurRad="57150" dist="19050" dir="5400000" algn="ctr" rotWithShape="0">
+                <a:srgbClr val="000000">
+                  <a:alpha val="63000"/>
+                </a:srgbClr>
+              </a:outerShdw>
+            </a:effectLst>
+          </c:spPr>
+          <c:invertIfNegative val="0"/>
+          <c:cat>
+            <c:strRef>
+              <c:extLst>
+                <c:ext xmlns:c15="http://schemas.microsoft.com/office/drawing/2012/chart" uri="{02D57815-91ED-43cb-92C2-25804820EDAC}">
+                  <c15:fullRef>
+                    <c15:sqref>Sheet1!$A$2:$A$5</c15:sqref>
+                  </c15:fullRef>
+                </c:ext>
+              </c:extLst>
+              <c:f>(Sheet1!$A$2,Sheet1!$A$4:$A$5)</c:f>
+              <c:strCache>
+                <c:ptCount val="1"/>
+                <c:pt idx="0">
+                  <c:v>download</c:v>
+                </c:pt>
+              </c:strCache>
+            </c:strRef>
+          </c:cat>
+          <c:val>
+            <c:numRef>
+              <c:extLst>
+                <c:ext xmlns:c15="http://schemas.microsoft.com/office/drawing/2012/chart" uri="{02D57815-91ED-43cb-92C2-25804820EDAC}">
+                  <c15:fullRef>
+                    <c15:sqref>Sheet1!$C$2:$C$5</c15:sqref>
+                  </c15:fullRef>
+                </c:ext>
+              </c:extLst>
+              <c:f>(Sheet1!$C$2,Sheet1!$C$4:$C$5)</c:f>
+              <c:numCache>
+                <c:formatCode>General</c:formatCode>
+                <c:ptCount val="3"/>
+                <c:pt idx="0">
+                  <c:v>8.92</c:v>
+                </c:pt>
+              </c:numCache>
+            </c:numRef>
+          </c:val>
+          <c:extLst>
+            <c:ext xmlns:c16="http://schemas.microsoft.com/office/drawing/2014/chart" uri="{C3380CC4-5D6E-409C-BE32-E72D297353CC}">
+              <c16:uniqueId val="{00000001-8915-407B-869A-25ED3E641BCF}"/>
+            </c:ext>
+          </c:extLst>
+        </c:ser>
+        <c:ser>
+          <c:idx val="2"/>
+          <c:order val="2"/>
+          <c:tx>
+            <c:strRef>
+              <c:f>Sheet1!$D$1</c:f>
+              <c:strCache>
+                <c:ptCount val="1"/>
+                <c:pt idx="0">
+                  <c:v>Group avg</c:v>
+                </c:pt>
+              </c:strCache>
+            </c:strRef>
+          </c:tx>
+          <c:spPr>
+            <a:gradFill rotWithShape="1">
+              <a:gsLst>
+                <a:gs pos="0">
+                  <a:schemeClr val="accent3">
+                    <a:satMod val="103000"/>
+                    <a:lumMod val="102000"/>
+                    <a:tint val="94000"/>
+                  </a:schemeClr>
+                </a:gs>
+                <a:gs pos="50000">
+                  <a:schemeClr val="accent3">
+                    <a:satMod val="110000"/>
+                    <a:lumMod val="100000"/>
+                    <a:shade val="100000"/>
+                  </a:schemeClr>
+                </a:gs>
+                <a:gs pos="100000">
+                  <a:schemeClr val="accent3">
+                    <a:lumMod val="99000"/>
+                    <a:satMod val="120000"/>
+                    <a:shade val="78000"/>
+                  </a:schemeClr>
+                </a:gs>
+              </a:gsLst>
+              <a:lin ang="5400000" scaled="0"/>
+            </a:gradFill>
+            <a:ln>
+              <a:noFill/>
+            </a:ln>
+            <a:effectLst>
+              <a:outerShdw blurRad="57150" dist="19050" dir="5400000" algn="ctr" rotWithShape="0">
+                <a:srgbClr val="000000">
+                  <a:alpha val="63000"/>
+                </a:srgbClr>
+              </a:outerShdw>
+            </a:effectLst>
+          </c:spPr>
+          <c:invertIfNegative val="0"/>
+          <c:cat>
+            <c:strRef>
+              <c:extLst>
+                <c:ext xmlns:c15="http://schemas.microsoft.com/office/drawing/2012/chart" uri="{02D57815-91ED-43cb-92C2-25804820EDAC}">
+                  <c15:fullRef>
+                    <c15:sqref>Sheet1!$A$2:$A$5</c15:sqref>
+                  </c15:fullRef>
+                </c:ext>
+              </c:extLst>
+              <c:f>(Sheet1!$A$2,Sheet1!$A$4:$A$5)</c:f>
+              <c:strCache>
+                <c:ptCount val="1"/>
+                <c:pt idx="0">
+                  <c:v>download</c:v>
+                </c:pt>
+              </c:strCache>
+            </c:strRef>
+          </c:cat>
+          <c:val>
+            <c:numRef>
+              <c:extLst>
+                <c:ext xmlns:c15="http://schemas.microsoft.com/office/drawing/2012/chart" uri="{02D57815-91ED-43cb-92C2-25804820EDAC}">
+                  <c15:fullRef>
+                    <c15:sqref>Sheet1!$D$2:$D$5</c15:sqref>
+                  </c15:fullRef>
+                </c:ext>
+              </c:extLst>
+              <c:f>(Sheet1!$D$2,Sheet1!$D$4:$D$5)</c:f>
+              <c:numCache>
+                <c:formatCode>General</c:formatCode>
+                <c:ptCount val="3"/>
+                <c:pt idx="0">
+                  <c:v>46.32</c:v>
+                </c:pt>
+              </c:numCache>
+            </c:numRef>
+          </c:val>
+          <c:extLst>
+            <c:ext xmlns:c16="http://schemas.microsoft.com/office/drawing/2014/chart" uri="{C3380CC4-5D6E-409C-BE32-E72D297353CC}">
+              <c16:uniqueId val="{00000002-8915-407B-869A-25ED3E641BCF}"/>
+            </c:ext>
+          </c:extLst>
+        </c:ser>
+        <c:ser>
+          <c:idx val="3"/>
+          <c:order val="3"/>
+          <c:tx>
+            <c:strRef>
+              <c:f>Sheet1!$E$1</c:f>
+              <c:strCache>
+                <c:ptCount val="1"/>
+                <c:pt idx="0">
+                  <c:v>My fastest</c:v>
+                </c:pt>
+              </c:strCache>
+            </c:strRef>
+          </c:tx>
+          <c:spPr>
+            <a:gradFill rotWithShape="1">
+              <a:gsLst>
+                <a:gs pos="0">
+                  <a:schemeClr val="accent4">
+                    <a:satMod val="103000"/>
+                    <a:lumMod val="102000"/>
+                    <a:tint val="94000"/>
+                  </a:schemeClr>
+                </a:gs>
+                <a:gs pos="50000">
+                  <a:schemeClr val="accent4">
+                    <a:satMod val="110000"/>
+                    <a:lumMod val="100000"/>
+                    <a:shade val="100000"/>
+                  </a:schemeClr>
+                </a:gs>
+                <a:gs pos="100000">
+                  <a:schemeClr val="accent4">
+                    <a:lumMod val="99000"/>
+                    <a:satMod val="120000"/>
+                    <a:shade val="78000"/>
+                  </a:schemeClr>
+                </a:gs>
+              </a:gsLst>
+              <a:lin ang="5400000" scaled="0"/>
+            </a:gradFill>
+            <a:ln>
+              <a:noFill/>
+            </a:ln>
+            <a:effectLst>
+              <a:outerShdw blurRad="57150" dist="19050" dir="5400000" algn="ctr" rotWithShape="0">
+                <a:srgbClr val="000000">
+                  <a:alpha val="63000"/>
+                </a:srgbClr>
+              </a:outerShdw>
+            </a:effectLst>
+          </c:spPr>
+          <c:invertIfNegative val="0"/>
+          <c:cat>
+            <c:strRef>
+              <c:extLst>
+                <c:ext xmlns:c15="http://schemas.microsoft.com/office/drawing/2012/chart" uri="{02D57815-91ED-43cb-92C2-25804820EDAC}">
+                  <c15:fullRef>
+                    <c15:sqref>Sheet1!$A$2:$A$5</c15:sqref>
+                  </c15:fullRef>
+                </c:ext>
+              </c:extLst>
+              <c:f>(Sheet1!$A$2,Sheet1!$A$4:$A$5)</c:f>
+              <c:strCache>
+                <c:ptCount val="1"/>
+                <c:pt idx="0">
+                  <c:v>download</c:v>
+                </c:pt>
+              </c:strCache>
+            </c:strRef>
+          </c:cat>
+          <c:val>
+            <c:numRef>
+              <c:extLst>
+                <c:ext xmlns:c15="http://schemas.microsoft.com/office/drawing/2012/chart" uri="{02D57815-91ED-43cb-92C2-25804820EDAC}">
+                  <c15:fullRef>
+                    <c15:sqref>Sheet1!$E$2:$E$5</c15:sqref>
+                  </c15:fullRef>
+                </c:ext>
+              </c:extLst>
+              <c:f>(Sheet1!$E$2,Sheet1!$E$4:$E$5)</c:f>
+              <c:numCache>
+                <c:formatCode>General</c:formatCode>
+                <c:ptCount val="3"/>
+                <c:pt idx="0">
+                  <c:v>13.85</c:v>
+                </c:pt>
+              </c:numCache>
+            </c:numRef>
+          </c:val>
+          <c:extLst>
+            <c:ext xmlns:c16="http://schemas.microsoft.com/office/drawing/2014/chart" uri="{C3380CC4-5D6E-409C-BE32-E72D297353CC}">
+              <c16:uniqueId val="{00000003-8915-407B-869A-25ED3E641BCF}"/>
+            </c:ext>
+          </c:extLst>
+        </c:ser>
+        <c:ser>
+          <c:idx val="4"/>
+          <c:order val="4"/>
+          <c:tx>
+            <c:strRef>
+              <c:f>Sheet1!$F$1</c:f>
+              <c:strCache>
+                <c:ptCount val="1"/>
+                <c:pt idx="0">
+                  <c:v>My slowest</c:v>
+                </c:pt>
+              </c:strCache>
+            </c:strRef>
+          </c:tx>
+          <c:spPr>
+            <a:gradFill rotWithShape="1">
+              <a:gsLst>
+                <a:gs pos="0">
+                  <a:schemeClr val="accent5">
+                    <a:satMod val="103000"/>
+                    <a:lumMod val="102000"/>
+                    <a:tint val="94000"/>
+                  </a:schemeClr>
+                </a:gs>
+                <a:gs pos="50000">
+                  <a:schemeClr val="accent5">
+                    <a:satMod val="110000"/>
+                    <a:lumMod val="100000"/>
+                    <a:shade val="100000"/>
+                  </a:schemeClr>
+                </a:gs>
+                <a:gs pos="100000">
+                  <a:schemeClr val="accent5">
+                    <a:lumMod val="99000"/>
+                    <a:satMod val="120000"/>
+                    <a:shade val="78000"/>
+                  </a:schemeClr>
+                </a:gs>
+              </a:gsLst>
+              <a:lin ang="5400000" scaled="0"/>
+            </a:gradFill>
+            <a:ln>
+              <a:noFill/>
+            </a:ln>
+            <a:effectLst>
+              <a:outerShdw blurRad="57150" dist="19050" dir="5400000" algn="ctr" rotWithShape="0">
+                <a:srgbClr val="000000">
+                  <a:alpha val="63000"/>
+                </a:srgbClr>
+              </a:outerShdw>
+            </a:effectLst>
+          </c:spPr>
+          <c:invertIfNegative val="0"/>
+          <c:cat>
+            <c:strRef>
+              <c:extLst>
+                <c:ext xmlns:c15="http://schemas.microsoft.com/office/drawing/2012/chart" uri="{02D57815-91ED-43cb-92C2-25804820EDAC}">
+                  <c15:fullRef>
+                    <c15:sqref>Sheet1!$A$2:$A$5</c15:sqref>
+                  </c15:fullRef>
+                </c:ext>
+              </c:extLst>
+              <c:f>(Sheet1!$A$2,Sheet1!$A$4:$A$5)</c:f>
+              <c:strCache>
+                <c:ptCount val="1"/>
+                <c:pt idx="0">
+                  <c:v>download</c:v>
+                </c:pt>
+              </c:strCache>
+            </c:strRef>
+          </c:cat>
+          <c:val>
+            <c:numRef>
+              <c:extLst>
+                <c:ext xmlns:c15="http://schemas.microsoft.com/office/drawing/2012/chart" uri="{02D57815-91ED-43cb-92C2-25804820EDAC}">
+                  <c15:fullRef>
+                    <c15:sqref>Sheet1!$F$2:$F$5</c15:sqref>
+                  </c15:fullRef>
+                </c:ext>
+              </c:extLst>
+              <c:f>(Sheet1!$F$2,Sheet1!$F$4:$F$5)</c:f>
+              <c:numCache>
+                <c:formatCode>General</c:formatCode>
+                <c:ptCount val="3"/>
+                <c:pt idx="0">
+                  <c:v>0.41</c:v>
+                </c:pt>
+              </c:numCache>
+            </c:numRef>
+          </c:val>
+          <c:extLst>
+            <c:ext xmlns:c16="http://schemas.microsoft.com/office/drawing/2014/chart" uri="{C3380CC4-5D6E-409C-BE32-E72D297353CC}">
+              <c16:uniqueId val="{00000004-8915-407B-869A-25ED3E641BCF}"/>
+            </c:ext>
+          </c:extLst>
+        </c:ser>
+        <c:ser>
+          <c:idx val="5"/>
+          <c:order val="5"/>
+          <c:tx>
+            <c:strRef>
+              <c:f>Sheet1!$G$1</c:f>
+              <c:strCache>
+                <c:ptCount val="1"/>
+                <c:pt idx="0">
+                  <c:v>Group fastest</c:v>
+                </c:pt>
+              </c:strCache>
+            </c:strRef>
+          </c:tx>
+          <c:spPr>
+            <a:gradFill rotWithShape="1">
+              <a:gsLst>
+                <a:gs pos="0">
+                  <a:schemeClr val="accent6">
+                    <a:satMod val="103000"/>
+                    <a:lumMod val="102000"/>
+                    <a:tint val="94000"/>
+                  </a:schemeClr>
+                </a:gs>
+                <a:gs pos="50000">
+                  <a:schemeClr val="accent6">
+                    <a:satMod val="110000"/>
+                    <a:lumMod val="100000"/>
+                    <a:shade val="100000"/>
+                  </a:schemeClr>
+                </a:gs>
+                <a:gs pos="100000">
+                  <a:schemeClr val="accent6">
+                    <a:lumMod val="99000"/>
+                    <a:satMod val="120000"/>
+                    <a:shade val="78000"/>
+                  </a:schemeClr>
+                </a:gs>
+              </a:gsLst>
+              <a:lin ang="5400000" scaled="0"/>
+            </a:gradFill>
+            <a:ln>
+              <a:noFill/>
+            </a:ln>
+            <a:effectLst>
+              <a:outerShdw blurRad="57150" dist="19050" dir="5400000" algn="ctr" rotWithShape="0">
+                <a:srgbClr val="000000">
+                  <a:alpha val="63000"/>
+                </a:srgbClr>
+              </a:outerShdw>
+            </a:effectLst>
+          </c:spPr>
+          <c:invertIfNegative val="0"/>
+          <c:cat>
+            <c:strRef>
+              <c:extLst>
+                <c:ext xmlns:c15="http://schemas.microsoft.com/office/drawing/2012/chart" uri="{02D57815-91ED-43cb-92C2-25804820EDAC}">
+                  <c15:fullRef>
+                    <c15:sqref>Sheet1!$A$2:$A$5</c15:sqref>
+                  </c15:fullRef>
+                </c:ext>
+              </c:extLst>
+              <c:f>(Sheet1!$A$2,Sheet1!$A$4:$A$5)</c:f>
+              <c:strCache>
+                <c:ptCount val="1"/>
+                <c:pt idx="0">
+                  <c:v>download</c:v>
+                </c:pt>
+              </c:strCache>
+            </c:strRef>
+          </c:cat>
+          <c:val>
+            <c:numRef>
+              <c:extLst>
+                <c:ext xmlns:c15="http://schemas.microsoft.com/office/drawing/2012/chart" uri="{02D57815-91ED-43cb-92C2-25804820EDAC}">
+                  <c15:fullRef>
+                    <c15:sqref>Sheet1!$G$2:$G$5</c15:sqref>
+                  </c15:fullRef>
+                </c:ext>
+              </c:extLst>
+              <c:f>(Sheet1!$G$2,Sheet1!$G$4:$G$5)</c:f>
+              <c:numCache>
+                <c:formatCode>General</c:formatCode>
+                <c:ptCount val="3"/>
+                <c:pt idx="0">
+                  <c:v>124.31</c:v>
+                </c:pt>
+              </c:numCache>
+            </c:numRef>
+          </c:val>
+          <c:extLst>
+            <c:ext xmlns:c16="http://schemas.microsoft.com/office/drawing/2014/chart" uri="{C3380CC4-5D6E-409C-BE32-E72D297353CC}">
+              <c16:uniqueId val="{00000005-8915-407B-869A-25ED3E641BCF}"/>
+            </c:ext>
+          </c:extLst>
+        </c:ser>
+        <c:ser>
+          <c:idx val="6"/>
+          <c:order val="6"/>
+          <c:tx>
+            <c:strRef>
+              <c:f>Sheet1!$H$1</c:f>
+              <c:strCache>
+                <c:ptCount val="1"/>
+                <c:pt idx="0">
+                  <c:v>Group slowest</c:v>
+                </c:pt>
+              </c:strCache>
+            </c:strRef>
+          </c:tx>
+          <c:spPr>
+            <a:gradFill rotWithShape="1">
+              <a:gsLst>
+                <a:gs pos="0">
+                  <a:schemeClr val="accent1">
+                    <a:lumMod val="60000"/>
+                    <a:satMod val="103000"/>
+                    <a:lumMod val="102000"/>
+                    <a:tint val="94000"/>
+                  </a:schemeClr>
+                </a:gs>
+                <a:gs pos="50000">
+                  <a:schemeClr val="accent1">
+                    <a:lumMod val="60000"/>
+                    <a:satMod val="110000"/>
+                    <a:lumMod val="100000"/>
+                    <a:shade val="100000"/>
+                  </a:schemeClr>
+                </a:gs>
+                <a:gs pos="100000">
+                  <a:schemeClr val="accent1">
+                    <a:lumMod val="60000"/>
+                    <a:lumMod val="99000"/>
+                    <a:satMod val="120000"/>
+                    <a:shade val="78000"/>
+                  </a:schemeClr>
+                </a:gs>
+              </a:gsLst>
+              <a:lin ang="5400000" scaled="0"/>
+            </a:gradFill>
+            <a:ln>
+              <a:noFill/>
+            </a:ln>
+            <a:effectLst>
+              <a:outerShdw blurRad="57150" dist="19050" dir="5400000" algn="ctr" rotWithShape="0">
+                <a:srgbClr val="000000">
+                  <a:alpha val="63000"/>
+                </a:srgbClr>
+              </a:outerShdw>
+            </a:effectLst>
+          </c:spPr>
+          <c:invertIfNegative val="0"/>
+          <c:cat>
+            <c:strRef>
+              <c:extLst>
+                <c:ext xmlns:c15="http://schemas.microsoft.com/office/drawing/2012/chart" uri="{02D57815-91ED-43cb-92C2-25804820EDAC}">
+                  <c15:fullRef>
+                    <c15:sqref>Sheet1!$A$2:$A$5</c15:sqref>
+                  </c15:fullRef>
+                </c:ext>
+              </c:extLst>
+              <c:f>(Sheet1!$A$2,Sheet1!$A$4:$A$5)</c:f>
+              <c:strCache>
+                <c:ptCount val="1"/>
+                <c:pt idx="0">
+                  <c:v>download</c:v>
+                </c:pt>
+              </c:strCache>
+            </c:strRef>
+          </c:cat>
+          <c:val>
+            <c:numRef>
+              <c:extLst>
+                <c:ext xmlns:c15="http://schemas.microsoft.com/office/drawing/2012/chart" uri="{02D57815-91ED-43cb-92C2-25804820EDAC}">
+                  <c15:fullRef>
+                    <c15:sqref>Sheet1!$H$2:$H$5</c15:sqref>
+                  </c15:fullRef>
+                </c:ext>
+              </c:extLst>
+              <c:f>(Sheet1!$H$2,Sheet1!$H$4:$H$5)</c:f>
+              <c:numCache>
+                <c:formatCode>General</c:formatCode>
+                <c:ptCount val="3"/>
+                <c:pt idx="0">
+                  <c:v>8.92</c:v>
+                </c:pt>
+              </c:numCache>
+            </c:numRef>
+          </c:val>
+          <c:extLst>
+            <c:ext xmlns:c16="http://schemas.microsoft.com/office/drawing/2014/chart" uri="{C3380CC4-5D6E-409C-BE32-E72D297353CC}">
+              <c16:uniqueId val="{00000006-8915-407B-869A-25ED3E641BCF}"/>
+            </c:ext>
+          </c:extLst>
+        </c:ser>
+        <c:dLbls>
+          <c:showLegendKey val="0"/>
+          <c:showVal val="0"/>
+          <c:showCatName val="0"/>
+          <c:showSerName val="0"/>
+          <c:showPercent val="0"/>
+          <c:showBubbleSize val="0"/>
+        </c:dLbls>
+        <c:gapWidth val="100"/>
+        <c:overlap val="-24"/>
+        <c:axId val="450201968"/>
+        <c:axId val="450205568"/>
+      </c:barChart>
+      <c:catAx>
+        <c:axId val="450201968"/>
+        <c:scaling>
+          <c:orientation val="minMax"/>
+        </c:scaling>
+        <c:delete val="0"/>
+        <c:axPos val="b"/>
+        <c:title>
+          <c:tx>
+            <c:rich>
+              <a:bodyPr rot="0" spcFirstLastPara="1" vertOverflow="ellipsis" vert="horz" wrap="square" anchor="ctr" anchorCtr="1"/>
+              <a:lstStyle/>
+              <a:p>
+                <a:pPr>
+                  <a:defRPr sz="1197" b="1" i="0" u="none" strike="noStrike" kern="1200" cap="all" baseline="0">
+                    <a:solidFill>
+                      <a:schemeClr val="lt1">
+                        <a:lumMod val="85000"/>
+                      </a:schemeClr>
+                    </a:solidFill>
+                    <a:latin typeface="+mn-lt"/>
+                    <a:ea typeface="+mn-ea"/>
+                    <a:cs typeface="+mn-cs"/>
+                  </a:defRPr>
+                </a:pPr>
+                <a:r>
+                  <a:rPr lang="en-GB" dirty="0"/>
+                  <a:t>Download</a:t>
+                </a:r>
+              </a:p>
+            </c:rich>
+          </c:tx>
+          <c:overlay val="0"/>
+          <c:spPr>
+            <a:noFill/>
+            <a:ln>
+              <a:noFill/>
+            </a:ln>
+            <a:effectLst/>
+          </c:spPr>
+          <c:txPr>
+            <a:bodyPr rot="0" spcFirstLastPara="1" vertOverflow="ellipsis" vert="horz" wrap="square" anchor="ctr" anchorCtr="1"/>
+            <a:lstStyle/>
+            <a:p>
+              <a:pPr>
+                <a:defRPr sz="1197" b="1" i="0" u="none" strike="noStrike" kern="1200" cap="all" baseline="0">
+                  <a:solidFill>
+                    <a:schemeClr val="lt1">
+                      <a:lumMod val="85000"/>
+                    </a:schemeClr>
+                  </a:solidFill>
+                  <a:latin typeface="+mn-lt"/>
+                  <a:ea typeface="+mn-ea"/>
+                  <a:cs typeface="+mn-cs"/>
+                </a:defRPr>
+              </a:pPr>
+              <a:endParaRPr lang="en-US"/>
+            </a:p>
+          </c:txPr>
+        </c:title>
+        <c:numFmt formatCode="General" sourceLinked="1"/>
+        <c:majorTickMark val="none"/>
+        <c:minorTickMark val="none"/>
+        <c:tickLblPos val="nextTo"/>
+        <c:spPr>
+          <a:noFill/>
+          <a:ln w="12700" cap="flat" cmpd="sng" algn="ctr">
+            <a:solidFill>
+              <a:schemeClr val="lt1">
+                <a:lumMod val="95000"/>
+                <a:alpha val="54000"/>
+              </a:schemeClr>
+            </a:solidFill>
+            <a:round/>
+          </a:ln>
+          <a:effectLst/>
+        </c:spPr>
+        <c:txPr>
+          <a:bodyPr rot="-60000000" spcFirstLastPara="1" vertOverflow="ellipsis" vert="horz" wrap="square" anchor="ctr" anchorCtr="1"/>
+          <a:lstStyle/>
+          <a:p>
+            <a:pPr>
+              <a:defRPr sz="1197" b="0" i="0" u="none" strike="noStrike" kern="1200" baseline="0">
+                <a:solidFill>
+                  <a:schemeClr val="lt1">
+                    <a:lumMod val="85000"/>
+                  </a:schemeClr>
+                </a:solidFill>
+                <a:latin typeface="+mn-lt"/>
+                <a:ea typeface="+mn-ea"/>
+                <a:cs typeface="+mn-cs"/>
+              </a:defRPr>
+            </a:pPr>
+            <a:endParaRPr lang="en-US"/>
+          </a:p>
+        </c:txPr>
+        <c:crossAx val="450205568"/>
+        <c:crosses val="autoZero"/>
+        <c:auto val="1"/>
+        <c:lblAlgn val="ctr"/>
+        <c:lblOffset val="100"/>
+        <c:noMultiLvlLbl val="0"/>
+      </c:catAx>
+      <c:valAx>
+        <c:axId val="450205568"/>
+        <c:scaling>
+          <c:orientation val="minMax"/>
+        </c:scaling>
+        <c:delete val="0"/>
+        <c:axPos val="l"/>
+        <c:majorGridlines>
+          <c:spPr>
+            <a:ln w="9525" cap="flat" cmpd="sng" algn="ctr">
+              <a:solidFill>
+                <a:schemeClr val="lt1">
+                  <a:lumMod val="95000"/>
+                  <a:alpha val="10000"/>
+                </a:schemeClr>
+              </a:solidFill>
+              <a:round/>
+            </a:ln>
+            <a:effectLst/>
+          </c:spPr>
+        </c:majorGridlines>
+        <c:title>
+          <c:tx>
+            <c:rich>
+              <a:bodyPr rot="-5400000" spcFirstLastPara="1" vertOverflow="ellipsis" vert="horz" wrap="square" anchor="ctr" anchorCtr="1"/>
+              <a:lstStyle/>
+              <a:p>
+                <a:pPr>
+                  <a:defRPr sz="1197" b="1" i="0" u="none" strike="noStrike" kern="1200" cap="all" baseline="0">
+                    <a:solidFill>
+                      <a:schemeClr val="lt1">
+                        <a:lumMod val="85000"/>
+                      </a:schemeClr>
+                    </a:solidFill>
+                    <a:latin typeface="+mn-lt"/>
+                    <a:ea typeface="+mn-ea"/>
+                    <a:cs typeface="+mn-cs"/>
+                  </a:defRPr>
+                </a:pPr>
+                <a:r>
+                  <a:rPr lang="en-GB" dirty="0"/>
+                  <a:t>MB/s</a:t>
+                </a:r>
+              </a:p>
+            </c:rich>
+          </c:tx>
+          <c:overlay val="0"/>
+          <c:spPr>
+            <a:noFill/>
+            <a:ln>
+              <a:noFill/>
+            </a:ln>
+            <a:effectLst/>
+          </c:spPr>
+          <c:txPr>
+            <a:bodyPr rot="-5400000" spcFirstLastPara="1" vertOverflow="ellipsis" vert="horz" wrap="square" anchor="ctr" anchorCtr="1"/>
+            <a:lstStyle/>
+            <a:p>
+              <a:pPr>
+                <a:defRPr sz="1197" b="1" i="0" u="none" strike="noStrike" kern="1200" cap="all" baseline="0">
+                  <a:solidFill>
+                    <a:schemeClr val="lt1">
+                      <a:lumMod val="85000"/>
+                    </a:schemeClr>
+                  </a:solidFill>
+                  <a:latin typeface="+mn-lt"/>
+                  <a:ea typeface="+mn-ea"/>
+                  <a:cs typeface="+mn-cs"/>
+                </a:defRPr>
+              </a:pPr>
+              <a:endParaRPr lang="en-US"/>
+            </a:p>
+          </c:txPr>
+        </c:title>
+        <c:numFmt formatCode="General" sourceLinked="1"/>
+        <c:majorTickMark val="none"/>
+        <c:minorTickMark val="none"/>
+        <c:tickLblPos val="nextTo"/>
+        <c:spPr>
+          <a:noFill/>
+          <a:ln>
+            <a:noFill/>
+          </a:ln>
+          <a:effectLst/>
+        </c:spPr>
+        <c:txPr>
+          <a:bodyPr rot="-60000000" spcFirstLastPara="1" vertOverflow="ellipsis" vert="horz" wrap="square" anchor="ctr" anchorCtr="1"/>
+          <a:lstStyle/>
+          <a:p>
+            <a:pPr>
+              <a:defRPr sz="1197" b="0" i="0" u="none" strike="noStrike" kern="1200" baseline="0">
+                <a:solidFill>
+                  <a:schemeClr val="lt1">
+                    <a:lumMod val="85000"/>
+                  </a:schemeClr>
+                </a:solidFill>
+                <a:latin typeface="+mn-lt"/>
+                <a:ea typeface="+mn-ea"/>
+                <a:cs typeface="+mn-cs"/>
+              </a:defRPr>
+            </a:pPr>
+            <a:endParaRPr lang="en-US"/>
+          </a:p>
+        </c:txPr>
+        <c:crossAx val="450201968"/>
+        <c:crosses val="autoZero"/>
+        <c:crossBetween val="between"/>
+      </c:valAx>
+      <c:spPr>
+        <a:noFill/>
+        <a:ln>
+          <a:noFill/>
+        </a:ln>
+        <a:effectLst/>
+      </c:spPr>
+    </c:plotArea>
+    <c:legend>
+      <c:legendPos val="r"/>
+      <c:overlay val="0"/>
+      <c:spPr>
+        <a:noFill/>
+        <a:ln>
+          <a:noFill/>
+        </a:ln>
+        <a:effectLst/>
+      </c:spPr>
+      <c:txPr>
+        <a:bodyPr rot="0" spcFirstLastPara="1" vertOverflow="ellipsis" vert="horz" wrap="square" anchor="ctr" anchorCtr="1"/>
+        <a:lstStyle/>
+        <a:p>
+          <a:pPr>
+            <a:defRPr sz="1197" b="0" i="0" u="none" strike="noStrike" kern="1200" baseline="0">
+              <a:solidFill>
+                <a:schemeClr val="lt1">
+                  <a:lumMod val="85000"/>
+                </a:schemeClr>
+              </a:solidFill>
+              <a:latin typeface="+mn-lt"/>
+              <a:ea typeface="+mn-ea"/>
+              <a:cs typeface="+mn-cs"/>
+            </a:defRPr>
+          </a:pPr>
+          <a:endParaRPr lang="en-US"/>
+        </a:p>
+      </c:txPr>
+    </c:legend>
+    <c:plotVisOnly val="1"/>
+    <c:dispBlanksAs val="gap"/>
+    <c:extLst>
+      <c:ext xmlns:c16r3="http://schemas.microsoft.com/office/drawing/2017/03/chart" uri="{56B9EC1D-385E-4148-901F-78D8002777C0}">
+        <c16r3:dataDisplayOptions16>
+          <c16r3:dispNaAsBlank val="1"/>
+        </c16r3:dataDisplayOptions16>
+      </c:ext>
+    </c:extLst>
+    <c:showDLblsOverMax val="0"/>
+  </c:chart>
+  <c:spPr>
+    <a:gradFill flip="none" rotWithShape="1">
+      <a:gsLst>
+        <a:gs pos="0">
+          <a:schemeClr val="dk1">
+            <a:lumMod val="65000"/>
+            <a:lumOff val="35000"/>
+          </a:schemeClr>
+        </a:gs>
+        <a:gs pos="100000">
+          <a:schemeClr val="dk1">
+            <a:lumMod val="85000"/>
+            <a:lumOff val="15000"/>
+          </a:schemeClr>
+        </a:gs>
+      </a:gsLst>
+      <a:path path="circle">
+        <a:fillToRect l="50000" t="50000" r="50000" b="50000"/>
+      </a:path>
+      <a:tileRect/>
+    </a:gradFill>
+    <a:ln>
+      <a:noFill/>
+    </a:ln>
+    <a:effectLst/>
+  </c:spPr>
+  <c:txPr>
+    <a:bodyPr/>
+    <a:lstStyle/>
+    <a:p>
+      <a:pPr>
+        <a:defRPr/>
+      </a:pPr>
+      <a:endParaRPr lang="en-US"/>
+    </a:p>
+  </c:txPr>
+  <c:externalData r:id="rId3">
+    <c:autoUpdate val="0"/>
+  </c:externalData>
+</c:chartSpace>
+</file>
+
+<file path=ppt/charts/chart2.xml><?xml version="1.0" encoding="utf-8"?>
+<c:chartSpace xmlns:c="http://schemas.openxmlformats.org/drawingml/2006/chart" xmlns:a="http://schemas.openxmlformats.org/drawingml/2006/main" xmlns:r="http://schemas.openxmlformats.org/officeDocument/2006/relationships" xmlns:c16r2="http://schemas.microsoft.com/office/drawing/2015/06/chart">
+  <c:date1904 val="0"/>
+  <c:lang val="en-GB"/>
+  <c:roundedCorners val="0"/>
+  <mc:AlternateContent xmlns:mc="http://schemas.openxmlformats.org/markup-compatibility/2006">
+    <mc:Choice xmlns:c14="http://schemas.microsoft.com/office/drawing/2007/8/2/chart" Requires="c14">
+      <c14:style val="102"/>
+    </mc:Choice>
+    <mc:Fallback>
+      <c:style val="2"/>
+    </mc:Fallback>
+  </mc:AlternateContent>
+  <c:chart>
+    <c:title>
+      <c:tx>
+        <c:rich>
+          <a:bodyPr rot="0" spcFirstLastPara="1" vertOverflow="ellipsis" vert="horz" wrap="square" anchor="ctr" anchorCtr="1"/>
+          <a:lstStyle/>
+          <a:p>
+            <a:pPr>
+              <a:defRPr sz="2128" b="1" i="0" u="none" strike="noStrike" kern="1200" spc="100" baseline="0">
+                <a:solidFill>
+                  <a:schemeClr val="lt1">
+                    <a:lumMod val="95000"/>
+                  </a:schemeClr>
+                </a:solidFill>
+                <a:effectLst>
+                  <a:outerShdw blurRad="50800" dist="38100" dir="5400000" algn="t" rotWithShape="0">
+                    <a:prstClr val="black">
+                      <a:alpha val="40000"/>
+                    </a:prstClr>
+                  </a:outerShdw>
+                </a:effectLst>
+                <a:latin typeface="+mn-lt"/>
+                <a:ea typeface="+mn-ea"/>
+                <a:cs typeface="+mn-cs"/>
+              </a:defRPr>
+            </a:pPr>
             <a:r>
               <a:rPr lang="en-GB" dirty="0"/>
-              <a:t> speeds</a:t>
+              <a:t>average upload speeds</a:t>
             </a:r>
           </a:p>
         </c:rich>
@@ -291,11 +1473,8 @@
             <c:strRef>
               <c:f>Sheet1!$A$2:$A$5</c:f>
               <c:strCache>
-                <c:ptCount val="2"/>
+                <c:ptCount val="1"/>
                 <c:pt idx="0">
-                  <c:v>download</c:v>
-                </c:pt>
-                <c:pt idx="1">
                   <c:v>upload</c:v>
                 </c:pt>
               </c:strCache>
@@ -306,11 +1485,8 @@
               <c:f>Sheet1!$B$2:$B$5</c:f>
               <c:numCache>
                 <c:formatCode>General</c:formatCode>
-                <c:ptCount val="4"/>
+                <c:ptCount val="3"/>
                 <c:pt idx="0">
-                  <c:v>73.209999999999994</c:v>
-                </c:pt>
-                <c:pt idx="1">
                   <c:v>18.399999999999999</c:v>
                 </c:pt>
               </c:numCache>
@@ -318,7 +1494,7 @@
           </c:val>
           <c:extLst>
             <c:ext xmlns:c16="http://schemas.microsoft.com/office/drawing/2014/chart" uri="{C3380CC4-5D6E-409C-BE32-E72D297353CC}">
-              <c16:uniqueId val="{00000000-8915-407B-869A-25ED3E641BCF}"/>
+              <c16:uniqueId val="{00000000-A8D8-4BE1-9C99-E40CA7595E26}"/>
             </c:ext>
           </c:extLst>
         </c:ser>
@@ -379,11 +1555,8 @@
             <c:strRef>
               <c:f>Sheet1!$A$2:$A$5</c:f>
               <c:strCache>
-                <c:ptCount val="2"/>
+                <c:ptCount val="1"/>
                 <c:pt idx="0">
-                  <c:v>download</c:v>
-                </c:pt>
-                <c:pt idx="1">
                   <c:v>upload</c:v>
                 </c:pt>
               </c:strCache>
@@ -394,11 +1567,8 @@
               <c:f>Sheet1!$C$2:$C$5</c:f>
               <c:numCache>
                 <c:formatCode>General</c:formatCode>
-                <c:ptCount val="4"/>
+                <c:ptCount val="3"/>
                 <c:pt idx="0">
-                  <c:v>8.92</c:v>
-                </c:pt>
-                <c:pt idx="1">
                   <c:v>10.33</c:v>
                 </c:pt>
               </c:numCache>
@@ -406,7 +1576,7 @@
           </c:val>
           <c:extLst>
             <c:ext xmlns:c16="http://schemas.microsoft.com/office/drawing/2014/chart" uri="{C3380CC4-5D6E-409C-BE32-E72D297353CC}">
-              <c16:uniqueId val="{00000001-8915-407B-869A-25ED3E641BCF}"/>
+              <c16:uniqueId val="{00000001-A8D8-4BE1-9C99-E40CA7595E26}"/>
             </c:ext>
           </c:extLst>
         </c:ser>
@@ -467,11 +1637,8 @@
             <c:strRef>
               <c:f>Sheet1!$A$2:$A$5</c:f>
               <c:strCache>
-                <c:ptCount val="2"/>
+                <c:ptCount val="1"/>
                 <c:pt idx="0">
-                  <c:v>download</c:v>
-                </c:pt>
-                <c:pt idx="1">
                   <c:v>upload</c:v>
                 </c:pt>
               </c:strCache>
@@ -482,11 +1649,8 @@
               <c:f>Sheet1!$D$2:$D$5</c:f>
               <c:numCache>
                 <c:formatCode>General</c:formatCode>
-                <c:ptCount val="4"/>
+                <c:ptCount val="3"/>
                 <c:pt idx="0">
-                  <c:v>46.32</c:v>
-                </c:pt>
-                <c:pt idx="1">
                   <c:v>10.18</c:v>
                 </c:pt>
               </c:numCache>
@@ -494,7 +1658,7 @@
           </c:val>
           <c:extLst>
             <c:ext xmlns:c16="http://schemas.microsoft.com/office/drawing/2014/chart" uri="{C3380CC4-5D6E-409C-BE32-E72D297353CC}">
-              <c16:uniqueId val="{00000002-8915-407B-869A-25ED3E641BCF}"/>
+              <c16:uniqueId val="{00000002-A8D8-4BE1-9C99-E40CA7595E26}"/>
             </c:ext>
           </c:extLst>
         </c:ser>
@@ -555,11 +1719,8 @@
             <c:strRef>
               <c:f>Sheet1!$A$2:$A$5</c:f>
               <c:strCache>
-                <c:ptCount val="2"/>
+                <c:ptCount val="1"/>
                 <c:pt idx="0">
-                  <c:v>download</c:v>
-                </c:pt>
-                <c:pt idx="1">
                   <c:v>upload</c:v>
                 </c:pt>
               </c:strCache>
@@ -570,11 +1731,8 @@
               <c:f>Sheet1!$E$2:$E$5</c:f>
               <c:numCache>
                 <c:formatCode>General</c:formatCode>
-                <c:ptCount val="4"/>
+                <c:ptCount val="3"/>
                 <c:pt idx="0">
-                  <c:v>13.85</c:v>
-                </c:pt>
-                <c:pt idx="1">
                   <c:v>14.57</c:v>
                 </c:pt>
               </c:numCache>
@@ -582,7 +1740,7 @@
           </c:val>
           <c:extLst>
             <c:ext xmlns:c16="http://schemas.microsoft.com/office/drawing/2014/chart" uri="{C3380CC4-5D6E-409C-BE32-E72D297353CC}">
-              <c16:uniqueId val="{00000003-8915-407B-869A-25ED3E641BCF}"/>
+              <c16:uniqueId val="{00000003-A8D8-4BE1-9C99-E40CA7595E26}"/>
             </c:ext>
           </c:extLst>
         </c:ser>
@@ -643,11 +1801,8 @@
             <c:strRef>
               <c:f>Sheet1!$A$2:$A$5</c:f>
               <c:strCache>
-                <c:ptCount val="2"/>
+                <c:ptCount val="1"/>
                 <c:pt idx="0">
-                  <c:v>download</c:v>
-                </c:pt>
-                <c:pt idx="1">
                   <c:v>upload</c:v>
                 </c:pt>
               </c:strCache>
@@ -658,11 +1813,8 @@
               <c:f>Sheet1!$F$2:$F$5</c:f>
               <c:numCache>
                 <c:formatCode>General</c:formatCode>
-                <c:ptCount val="4"/>
+                <c:ptCount val="3"/>
                 <c:pt idx="0">
-                  <c:v>0.41</c:v>
-                </c:pt>
-                <c:pt idx="1">
                   <c:v>0.39</c:v>
                 </c:pt>
               </c:numCache>
@@ -670,7 +1822,7 @@
           </c:val>
           <c:extLst>
             <c:ext xmlns:c16="http://schemas.microsoft.com/office/drawing/2014/chart" uri="{C3380CC4-5D6E-409C-BE32-E72D297353CC}">
-              <c16:uniqueId val="{00000004-8915-407B-869A-25ED3E641BCF}"/>
+              <c16:uniqueId val="{00000004-A8D8-4BE1-9C99-E40CA7595E26}"/>
             </c:ext>
           </c:extLst>
         </c:ser>
@@ -731,11 +1883,8 @@
             <c:strRef>
               <c:f>Sheet1!$A$2:$A$5</c:f>
               <c:strCache>
-                <c:ptCount val="2"/>
+                <c:ptCount val="1"/>
                 <c:pt idx="0">
-                  <c:v>download</c:v>
-                </c:pt>
-                <c:pt idx="1">
                   <c:v>upload</c:v>
                 </c:pt>
               </c:strCache>
@@ -746,11 +1895,8 @@
               <c:f>Sheet1!$G$2:$G$5</c:f>
               <c:numCache>
                 <c:formatCode>General</c:formatCode>
-                <c:ptCount val="4"/>
+                <c:ptCount val="3"/>
                 <c:pt idx="0">
-                  <c:v>124.31</c:v>
-                </c:pt>
-                <c:pt idx="1">
                   <c:v>22.58</c:v>
                 </c:pt>
               </c:numCache>
@@ -758,7 +1904,7 @@
           </c:val>
           <c:extLst>
             <c:ext xmlns:c16="http://schemas.microsoft.com/office/drawing/2014/chart" uri="{C3380CC4-5D6E-409C-BE32-E72D297353CC}">
-              <c16:uniqueId val="{00000005-8915-407B-869A-25ED3E641BCF}"/>
+              <c16:uniqueId val="{00000005-A8D8-4BE1-9C99-E40CA7595E26}"/>
             </c:ext>
           </c:extLst>
         </c:ser>
@@ -822,11 +1968,8 @@
             <c:strRef>
               <c:f>Sheet1!$A$2:$A$5</c:f>
               <c:strCache>
-                <c:ptCount val="2"/>
+                <c:ptCount val="1"/>
                 <c:pt idx="0">
-                  <c:v>download</c:v>
-                </c:pt>
-                <c:pt idx="1">
                   <c:v>upload</c:v>
                 </c:pt>
               </c:strCache>
@@ -837,11 +1980,8 @@
               <c:f>Sheet1!$H$2:$H$5</c:f>
               <c:numCache>
                 <c:formatCode>General</c:formatCode>
-                <c:ptCount val="4"/>
+                <c:ptCount val="3"/>
                 <c:pt idx="0">
-                  <c:v>8.92</c:v>
-                </c:pt>
-                <c:pt idx="1">
                   <c:v>0.71</c:v>
                 </c:pt>
               </c:numCache>
@@ -849,12 +1989,11 @@
           </c:val>
           <c:extLst>
             <c:ext xmlns:c16="http://schemas.microsoft.com/office/drawing/2014/chart" uri="{C3380CC4-5D6E-409C-BE32-E72D297353CC}">
-              <c16:uniqueId val="{00000006-8915-407B-869A-25ED3E641BCF}"/>
+              <c16:uniqueId val="{00000006-A8D8-4BE1-9C99-E40CA7595E26}"/>
             </c:ext>
           </c:extLst>
         </c:ser>
         <c:dLbls>
-          <c:dLblPos val="outEnd"/>
           <c:showLegendKey val="0"/>
           <c:showVal val="0"/>
           <c:showCatName val="0"/>
@@ -894,7 +2033,7 @@
                 </a:pPr>
                 <a:r>
                   <a:rPr lang="en-GB" dirty="0"/>
-                  <a:t>Download &amp; upload</a:t>
+                  <a:t>upload</a:t>
                 </a:r>
               </a:p>
             </c:rich>
@@ -1209,7 +2348,543 @@
 </cs:colorStyle>
 </file>
 
+<file path=ppt/charts/colors2.xml><?xml version="1.0" encoding="utf-8"?>
+<cs:colorStyle xmlns:cs="http://schemas.microsoft.com/office/drawing/2012/chartStyle" xmlns:a="http://schemas.openxmlformats.org/drawingml/2006/main" meth="cycle" id="10">
+  <a:schemeClr val="accent1"/>
+  <a:schemeClr val="accent2"/>
+  <a:schemeClr val="accent3"/>
+  <a:schemeClr val="accent4"/>
+  <a:schemeClr val="accent5"/>
+  <a:schemeClr val="accent6"/>
+  <cs:variation/>
+  <cs:variation>
+    <a:lumMod val="60000"/>
+  </cs:variation>
+  <cs:variation>
+    <a:lumMod val="80000"/>
+    <a:lumOff val="20000"/>
+  </cs:variation>
+  <cs:variation>
+    <a:lumMod val="80000"/>
+  </cs:variation>
+  <cs:variation>
+    <a:lumMod val="60000"/>
+    <a:lumOff val="40000"/>
+  </cs:variation>
+  <cs:variation>
+    <a:lumMod val="50000"/>
+  </cs:variation>
+  <cs:variation>
+    <a:lumMod val="70000"/>
+    <a:lumOff val="30000"/>
+  </cs:variation>
+  <cs:variation>
+    <a:lumMod val="70000"/>
+  </cs:variation>
+  <cs:variation>
+    <a:lumMod val="50000"/>
+    <a:lumOff val="50000"/>
+  </cs:variation>
+</cs:colorStyle>
+</file>
+
 <file path=ppt/charts/style1.xml><?xml version="1.0" encoding="utf-8"?>
+<cs:chartStyle xmlns:cs="http://schemas.microsoft.com/office/drawing/2012/chartStyle" xmlns:a="http://schemas.openxmlformats.org/drawingml/2006/main" id="209">
+  <cs:axisTitle>
+    <cs:lnRef idx="0"/>
+    <cs:fillRef idx="0"/>
+    <cs:effectRef idx="0"/>
+    <cs:fontRef idx="minor">
+      <a:schemeClr val="lt1">
+        <a:lumMod val="85000"/>
+      </a:schemeClr>
+    </cs:fontRef>
+    <cs:defRPr sz="1197" b="1" kern="1200" cap="all"/>
+  </cs:axisTitle>
+  <cs:categoryAxis>
+    <cs:lnRef idx="0"/>
+    <cs:fillRef idx="0"/>
+    <cs:effectRef idx="0"/>
+    <cs:fontRef idx="minor">
+      <a:schemeClr val="lt1">
+        <a:lumMod val="85000"/>
+      </a:schemeClr>
+    </cs:fontRef>
+    <cs:spPr>
+      <a:ln w="12700" cap="flat" cmpd="sng" algn="ctr">
+        <a:solidFill>
+          <a:schemeClr val="lt1">
+            <a:lumMod val="95000"/>
+            <a:alpha val="54000"/>
+          </a:schemeClr>
+        </a:solidFill>
+        <a:round/>
+      </a:ln>
+    </cs:spPr>
+    <cs:defRPr sz="1197" kern="1200"/>
+  </cs:categoryAxis>
+  <cs:chartArea>
+    <cs:lnRef idx="0"/>
+    <cs:fillRef idx="0"/>
+    <cs:effectRef idx="0"/>
+    <cs:fontRef idx="minor">
+      <a:schemeClr val="dk1"/>
+    </cs:fontRef>
+    <cs:spPr>
+      <a:gradFill flip="none" rotWithShape="1">
+        <a:gsLst>
+          <a:gs pos="0">
+            <a:schemeClr val="dk1">
+              <a:lumMod val="65000"/>
+              <a:lumOff val="35000"/>
+            </a:schemeClr>
+          </a:gs>
+          <a:gs pos="100000">
+            <a:schemeClr val="dk1">
+              <a:lumMod val="85000"/>
+              <a:lumOff val="15000"/>
+            </a:schemeClr>
+          </a:gs>
+        </a:gsLst>
+        <a:path path="circle">
+          <a:fillToRect l="50000" t="50000" r="50000" b="50000"/>
+        </a:path>
+        <a:tileRect/>
+      </a:gradFill>
+    </cs:spPr>
+    <cs:defRPr sz="1330" kern="1200"/>
+  </cs:chartArea>
+  <cs:dataLabel>
+    <cs:lnRef idx="0"/>
+    <cs:fillRef idx="0"/>
+    <cs:effectRef idx="0"/>
+    <cs:fontRef idx="minor">
+      <a:schemeClr val="lt1">
+        <a:lumMod val="85000"/>
+      </a:schemeClr>
+    </cs:fontRef>
+    <cs:defRPr sz="1197" kern="1200"/>
+  </cs:dataLabel>
+  <cs:dataLabelCallout>
+    <cs:lnRef idx="0"/>
+    <cs:fillRef idx="0"/>
+    <cs:effectRef idx="0"/>
+    <cs:fontRef idx="minor">
+      <a:schemeClr val="dk1">
+        <a:lumMod val="65000"/>
+        <a:lumOff val="35000"/>
+      </a:schemeClr>
+    </cs:fontRef>
+    <cs:spPr>
+      <a:solidFill>
+        <a:schemeClr val="lt1"/>
+      </a:solidFill>
+    </cs:spPr>
+    <cs:defRPr sz="1197" kern="1200"/>
+    <cs:bodyPr rot="0" spcFirstLastPara="1" vertOverflow="clip" horzOverflow="clip" vert="horz" wrap="square" lIns="36576" tIns="18288" rIns="36576" bIns="18288" anchor="ctr" anchorCtr="1">
+      <a:spAutoFit/>
+    </cs:bodyPr>
+  </cs:dataLabelCallout>
+  <cs:dataPoint>
+    <cs:lnRef idx="0"/>
+    <cs:fillRef idx="3">
+      <cs:styleClr val="auto"/>
+    </cs:fillRef>
+    <cs:effectRef idx="3"/>
+    <cs:fontRef idx="minor">
+      <a:schemeClr val="lt1"/>
+    </cs:fontRef>
+  </cs:dataPoint>
+  <cs:dataPoint3D>
+    <cs:lnRef idx="0"/>
+    <cs:fillRef idx="3">
+      <cs:styleClr val="auto"/>
+    </cs:fillRef>
+    <cs:effectRef idx="3"/>
+    <cs:fontRef idx="minor">
+      <a:schemeClr val="lt1"/>
+    </cs:fontRef>
+  </cs:dataPoint3D>
+  <cs:dataPointLine>
+    <cs:lnRef idx="0">
+      <cs:styleClr val="auto"/>
+    </cs:lnRef>
+    <cs:fillRef idx="3"/>
+    <cs:effectRef idx="3"/>
+    <cs:fontRef idx="minor">
+      <a:schemeClr val="lt1"/>
+    </cs:fontRef>
+    <cs:spPr>
+      <a:ln w="34925" cap="rnd">
+        <a:solidFill>
+          <a:schemeClr val="phClr"/>
+        </a:solidFill>
+        <a:round/>
+      </a:ln>
+    </cs:spPr>
+  </cs:dataPointLine>
+  <cs:dataPointMarker>
+    <cs:lnRef idx="0">
+      <cs:styleClr val="auto"/>
+    </cs:lnRef>
+    <cs:fillRef idx="3">
+      <cs:styleClr val="auto"/>
+    </cs:fillRef>
+    <cs:effectRef idx="3"/>
+    <cs:fontRef idx="minor">
+      <a:schemeClr val="lt1"/>
+    </cs:fontRef>
+    <cs:spPr>
+      <a:ln w="9525">
+        <a:solidFill>
+          <a:schemeClr val="phClr"/>
+        </a:solidFill>
+        <a:round/>
+      </a:ln>
+    </cs:spPr>
+  </cs:dataPointMarker>
+  <cs:dataPointMarkerLayout symbol="circle" size="6"/>
+  <cs:dataPointWireframe>
+    <cs:lnRef idx="0">
+      <cs:styleClr val="auto"/>
+    </cs:lnRef>
+    <cs:fillRef idx="3"/>
+    <cs:effectRef idx="3"/>
+    <cs:fontRef idx="minor">
+      <a:schemeClr val="lt1"/>
+    </cs:fontRef>
+    <cs:spPr>
+      <a:ln w="9525" cap="rnd">
+        <a:solidFill>
+          <a:schemeClr val="phClr"/>
+        </a:solidFill>
+        <a:round/>
+      </a:ln>
+    </cs:spPr>
+  </cs:dataPointWireframe>
+  <cs:dataTable>
+    <cs:lnRef idx="0"/>
+    <cs:fillRef idx="0"/>
+    <cs:effectRef idx="0"/>
+    <cs:fontRef idx="minor">
+      <a:schemeClr val="lt1">
+        <a:lumMod val="85000"/>
+      </a:schemeClr>
+    </cs:fontRef>
+    <cs:spPr>
+      <a:ln w="9525">
+        <a:solidFill>
+          <a:schemeClr val="lt1">
+            <a:lumMod val="95000"/>
+            <a:alpha val="54000"/>
+          </a:schemeClr>
+        </a:solidFill>
+      </a:ln>
+    </cs:spPr>
+    <cs:defRPr sz="1197" kern="1200"/>
+  </cs:dataTable>
+  <cs:downBar>
+    <cs:lnRef idx="0"/>
+    <cs:fillRef idx="0"/>
+    <cs:effectRef idx="0"/>
+    <cs:fontRef idx="minor">
+      <a:schemeClr val="lt1"/>
+    </cs:fontRef>
+    <cs:spPr>
+      <a:solidFill>
+        <a:schemeClr val="dk1">
+          <a:lumMod val="75000"/>
+          <a:lumOff val="25000"/>
+        </a:schemeClr>
+      </a:solidFill>
+      <a:ln w="9525">
+        <a:solidFill>
+          <a:schemeClr val="lt1">
+            <a:lumMod val="95000"/>
+            <a:alpha val="54000"/>
+          </a:schemeClr>
+        </a:solidFill>
+      </a:ln>
+    </cs:spPr>
+  </cs:downBar>
+  <cs:dropLine>
+    <cs:lnRef idx="0"/>
+    <cs:fillRef idx="0"/>
+    <cs:effectRef idx="0"/>
+    <cs:fontRef idx="minor">
+      <a:schemeClr val="lt1"/>
+    </cs:fontRef>
+    <cs:spPr>
+      <a:ln w="9525">
+        <a:solidFill>
+          <a:schemeClr val="lt1">
+            <a:lumMod val="95000"/>
+            <a:alpha val="54000"/>
+          </a:schemeClr>
+        </a:solidFill>
+        <a:prstDash val="dash"/>
+      </a:ln>
+    </cs:spPr>
+  </cs:dropLine>
+  <cs:errorBar>
+    <cs:lnRef idx="0"/>
+    <cs:fillRef idx="0"/>
+    <cs:effectRef idx="0"/>
+    <cs:fontRef idx="minor">
+      <a:schemeClr val="lt1"/>
+    </cs:fontRef>
+    <cs:spPr>
+      <a:ln w="9525" cap="flat" cmpd="sng" algn="ctr">
+        <a:solidFill>
+          <a:schemeClr val="lt1">
+            <a:lumMod val="95000"/>
+          </a:schemeClr>
+        </a:solidFill>
+        <a:round/>
+      </a:ln>
+    </cs:spPr>
+  </cs:errorBar>
+  <cs:floor>
+    <cs:lnRef idx="0"/>
+    <cs:fillRef idx="0"/>
+    <cs:effectRef idx="0"/>
+    <cs:fontRef idx="minor">
+      <a:schemeClr val="lt1"/>
+    </cs:fontRef>
+  </cs:floor>
+  <cs:gridlineMajor>
+    <cs:lnRef idx="0"/>
+    <cs:fillRef idx="0"/>
+    <cs:effectRef idx="0"/>
+    <cs:fontRef idx="minor">
+      <a:schemeClr val="lt1"/>
+    </cs:fontRef>
+    <cs:spPr>
+      <a:ln w="9525" cap="flat" cmpd="sng" algn="ctr">
+        <a:solidFill>
+          <a:schemeClr val="lt1">
+            <a:lumMod val="95000"/>
+            <a:alpha val="10000"/>
+          </a:schemeClr>
+        </a:solidFill>
+        <a:round/>
+      </a:ln>
+    </cs:spPr>
+  </cs:gridlineMajor>
+  <cs:gridlineMinor>
+    <cs:lnRef idx="0"/>
+    <cs:fillRef idx="0"/>
+    <cs:effectRef idx="0"/>
+    <cs:fontRef idx="minor">
+      <a:schemeClr val="lt1"/>
+    </cs:fontRef>
+    <cs:spPr>
+      <a:ln>
+        <a:solidFill>
+          <a:schemeClr val="lt1">
+            <a:lumMod val="95000"/>
+            <a:alpha val="5000"/>
+          </a:schemeClr>
+        </a:solidFill>
+      </a:ln>
+    </cs:spPr>
+  </cs:gridlineMinor>
+  <cs:hiLoLine>
+    <cs:lnRef idx="0"/>
+    <cs:fillRef idx="0"/>
+    <cs:effectRef idx="0"/>
+    <cs:fontRef idx="minor">
+      <a:schemeClr val="lt1"/>
+    </cs:fontRef>
+    <cs:spPr>
+      <a:ln w="9525">
+        <a:solidFill>
+          <a:schemeClr val="lt1">
+            <a:lumMod val="95000"/>
+            <a:alpha val="54000"/>
+          </a:schemeClr>
+        </a:solidFill>
+        <a:prstDash val="dash"/>
+      </a:ln>
+    </cs:spPr>
+  </cs:hiLoLine>
+  <cs:leaderLine>
+    <cs:lnRef idx="0"/>
+    <cs:fillRef idx="0"/>
+    <cs:effectRef idx="0"/>
+    <cs:fontRef idx="minor">
+      <a:schemeClr val="lt1"/>
+    </cs:fontRef>
+    <cs:spPr>
+      <a:ln w="9525">
+        <a:solidFill>
+          <a:schemeClr val="lt1">
+            <a:lumMod val="95000"/>
+            <a:alpha val="54000"/>
+          </a:schemeClr>
+        </a:solidFill>
+      </a:ln>
+    </cs:spPr>
+  </cs:leaderLine>
+  <cs:legend>
+    <cs:lnRef idx="0"/>
+    <cs:fillRef idx="0"/>
+    <cs:effectRef idx="0"/>
+    <cs:fontRef idx="minor">
+      <a:schemeClr val="lt1">
+        <a:lumMod val="85000"/>
+      </a:schemeClr>
+    </cs:fontRef>
+    <cs:defRPr sz="1197" kern="1200"/>
+  </cs:legend>
+  <cs:plotArea>
+    <cs:lnRef idx="0"/>
+    <cs:fillRef idx="0"/>
+    <cs:effectRef idx="0"/>
+    <cs:fontRef idx="minor">
+      <a:schemeClr val="lt1"/>
+    </cs:fontRef>
+  </cs:plotArea>
+  <cs:plotArea3D>
+    <cs:lnRef idx="0"/>
+    <cs:fillRef idx="0"/>
+    <cs:effectRef idx="0"/>
+    <cs:fontRef idx="minor">
+      <a:schemeClr val="lt1"/>
+    </cs:fontRef>
+  </cs:plotArea3D>
+  <cs:seriesAxis>
+    <cs:lnRef idx="0"/>
+    <cs:fillRef idx="0"/>
+    <cs:effectRef idx="0"/>
+    <cs:fontRef idx="minor">
+      <a:schemeClr val="lt1">
+        <a:lumMod val="85000"/>
+      </a:schemeClr>
+    </cs:fontRef>
+    <cs:spPr>
+      <a:ln w="12700" cap="flat" cmpd="sng" algn="ctr">
+        <a:solidFill>
+          <a:schemeClr val="lt1">
+            <a:lumMod val="95000"/>
+            <a:alpha val="54000"/>
+          </a:schemeClr>
+        </a:solidFill>
+        <a:round/>
+      </a:ln>
+    </cs:spPr>
+    <cs:defRPr sz="1197" kern="1200"/>
+  </cs:seriesAxis>
+  <cs:seriesLine>
+    <cs:lnRef idx="0"/>
+    <cs:fillRef idx="0"/>
+    <cs:effectRef idx="0"/>
+    <cs:fontRef idx="minor">
+      <a:schemeClr val="lt1"/>
+    </cs:fontRef>
+    <cs:spPr>
+      <a:ln w="9525" cap="flat" cmpd="sng" algn="ctr">
+        <a:solidFill>
+          <a:schemeClr val="lt1">
+            <a:lumMod val="95000"/>
+            <a:alpha val="54000"/>
+          </a:schemeClr>
+        </a:solidFill>
+        <a:round/>
+      </a:ln>
+    </cs:spPr>
+  </cs:seriesLine>
+  <cs:title>
+    <cs:lnRef idx="0"/>
+    <cs:fillRef idx="0"/>
+    <cs:effectRef idx="0"/>
+    <cs:fontRef idx="minor">
+      <a:schemeClr val="lt1">
+        <a:lumMod val="95000"/>
+      </a:schemeClr>
+    </cs:fontRef>
+    <cs:defRPr sz="2128" b="1" kern="1200" spc="100" baseline="0">
+      <a:effectLst>
+        <a:outerShdw blurRad="50800" dist="38100" dir="5400000" algn="t" rotWithShape="0">
+          <a:prstClr val="black">
+            <a:alpha val="40000"/>
+          </a:prstClr>
+        </a:outerShdw>
+      </a:effectLst>
+    </cs:defRPr>
+  </cs:title>
+  <cs:trendline>
+    <cs:lnRef idx="0">
+      <cs:styleClr val="auto"/>
+    </cs:lnRef>
+    <cs:fillRef idx="0"/>
+    <cs:effectRef idx="0"/>
+    <cs:fontRef idx="minor">
+      <a:schemeClr val="lt1"/>
+    </cs:fontRef>
+    <cs:spPr>
+      <a:ln w="19050" cap="rnd">
+        <a:solidFill>
+          <a:schemeClr val="phClr"/>
+        </a:solidFill>
+      </a:ln>
+    </cs:spPr>
+  </cs:trendline>
+  <cs:trendlineLabel>
+    <cs:lnRef idx="0"/>
+    <cs:fillRef idx="0"/>
+    <cs:effectRef idx="0"/>
+    <cs:fontRef idx="minor">
+      <a:schemeClr val="lt1">
+        <a:lumMod val="85000"/>
+      </a:schemeClr>
+    </cs:fontRef>
+    <cs:defRPr sz="1197" kern="1200"/>
+  </cs:trendlineLabel>
+  <cs:upBar>
+    <cs:lnRef idx="0"/>
+    <cs:fillRef idx="0"/>
+    <cs:effectRef idx="0"/>
+    <cs:fontRef idx="minor">
+      <a:schemeClr val="lt1"/>
+    </cs:fontRef>
+    <cs:spPr>
+      <a:solidFill>
+        <a:schemeClr val="lt1"/>
+      </a:solidFill>
+      <a:ln w="9525">
+        <a:solidFill>
+          <a:schemeClr val="lt1">
+            <a:lumMod val="95000"/>
+            <a:alpha val="54000"/>
+          </a:schemeClr>
+        </a:solidFill>
+      </a:ln>
+    </cs:spPr>
+  </cs:upBar>
+  <cs:valueAxis>
+    <cs:lnRef idx="0"/>
+    <cs:fillRef idx="0"/>
+    <cs:effectRef idx="0"/>
+    <cs:fontRef idx="minor">
+      <a:schemeClr val="lt1">
+        <a:lumMod val="85000"/>
+      </a:schemeClr>
+    </cs:fontRef>
+    <cs:defRPr sz="1197" kern="1200"/>
+  </cs:valueAxis>
+  <cs:wall>
+    <cs:lnRef idx="0"/>
+    <cs:fillRef idx="0"/>
+    <cs:effectRef idx="0"/>
+    <cs:fontRef idx="minor">
+      <a:schemeClr val="lt1"/>
+    </cs:fontRef>
+  </cs:wall>
+</cs:chartStyle>
+</file>
+
+<file path=ppt/charts/style2.xml><?xml version="1.0" encoding="utf-8"?>
 <cs:chartStyle xmlns:cs="http://schemas.microsoft.com/office/drawing/2012/chartStyle" xmlns:a="http://schemas.openxmlformats.org/drawingml/2006/main" id="209">
   <cs:axisTitle>
     <cs:lnRef idx="0"/>
@@ -1852,7 +3527,7 @@
           <a:p>
             <a:fld id="{2A12C254-DF0A-4B2A-AFC6-8C5BFD04BE90}" type="datetimeFigureOut">
               <a:rPr lang="en-GB" smtClean="0"/>
-              <a:t>25/10/2024</a:t>
+              <a:t>31/10/2024</a:t>
             </a:fld>
             <a:endParaRPr lang="en-GB"/>
           </a:p>
@@ -2050,7 +3725,7 @@
           <a:p>
             <a:fld id="{2A12C254-DF0A-4B2A-AFC6-8C5BFD04BE90}" type="datetimeFigureOut">
               <a:rPr lang="en-GB" smtClean="0"/>
-              <a:t>25/10/2024</a:t>
+              <a:t>31/10/2024</a:t>
             </a:fld>
             <a:endParaRPr lang="en-GB"/>
           </a:p>
@@ -2258,7 +3933,7 @@
           <a:p>
             <a:fld id="{2A12C254-DF0A-4B2A-AFC6-8C5BFD04BE90}" type="datetimeFigureOut">
               <a:rPr lang="en-GB" smtClean="0"/>
-              <a:t>25/10/2024</a:t>
+              <a:t>31/10/2024</a:t>
             </a:fld>
             <a:endParaRPr lang="en-GB"/>
           </a:p>
@@ -2456,7 +4131,7 @@
           <a:p>
             <a:fld id="{2A12C254-DF0A-4B2A-AFC6-8C5BFD04BE90}" type="datetimeFigureOut">
               <a:rPr lang="en-GB" smtClean="0"/>
-              <a:t>25/10/2024</a:t>
+              <a:t>31/10/2024</a:t>
             </a:fld>
             <a:endParaRPr lang="en-GB"/>
           </a:p>
@@ -2731,7 +4406,7 @@
           <a:p>
             <a:fld id="{2A12C254-DF0A-4B2A-AFC6-8C5BFD04BE90}" type="datetimeFigureOut">
               <a:rPr lang="en-GB" smtClean="0"/>
-              <a:t>25/10/2024</a:t>
+              <a:t>31/10/2024</a:t>
             </a:fld>
             <a:endParaRPr lang="en-GB"/>
           </a:p>
@@ -2996,7 +4671,7 @@
           <a:p>
             <a:fld id="{2A12C254-DF0A-4B2A-AFC6-8C5BFD04BE90}" type="datetimeFigureOut">
               <a:rPr lang="en-GB" smtClean="0"/>
-              <a:t>25/10/2024</a:t>
+              <a:t>31/10/2024</a:t>
             </a:fld>
             <a:endParaRPr lang="en-GB"/>
           </a:p>
@@ -3408,7 +5083,7 @@
           <a:p>
             <a:fld id="{2A12C254-DF0A-4B2A-AFC6-8C5BFD04BE90}" type="datetimeFigureOut">
               <a:rPr lang="en-GB" smtClean="0"/>
-              <a:t>25/10/2024</a:t>
+              <a:t>31/10/2024</a:t>
             </a:fld>
             <a:endParaRPr lang="en-GB"/>
           </a:p>
@@ -3549,7 +5224,7 @@
           <a:p>
             <a:fld id="{2A12C254-DF0A-4B2A-AFC6-8C5BFD04BE90}" type="datetimeFigureOut">
               <a:rPr lang="en-GB" smtClean="0"/>
-              <a:t>25/10/2024</a:t>
+              <a:t>31/10/2024</a:t>
             </a:fld>
             <a:endParaRPr lang="en-GB"/>
           </a:p>
@@ -3662,7 +5337,7 @@
           <a:p>
             <a:fld id="{2A12C254-DF0A-4B2A-AFC6-8C5BFD04BE90}" type="datetimeFigureOut">
               <a:rPr lang="en-GB" smtClean="0"/>
-              <a:t>25/10/2024</a:t>
+              <a:t>31/10/2024</a:t>
             </a:fld>
             <a:endParaRPr lang="en-GB"/>
           </a:p>
@@ -3973,7 +5648,7 @@
           <a:p>
             <a:fld id="{2A12C254-DF0A-4B2A-AFC6-8C5BFD04BE90}" type="datetimeFigureOut">
               <a:rPr lang="en-GB" smtClean="0"/>
-              <a:t>25/10/2024</a:t>
+              <a:t>31/10/2024</a:t>
             </a:fld>
             <a:endParaRPr lang="en-GB"/>
           </a:p>
@@ -4261,7 +5936,7 @@
           <a:p>
             <a:fld id="{2A12C254-DF0A-4B2A-AFC6-8C5BFD04BE90}" type="datetimeFigureOut">
               <a:rPr lang="en-GB" smtClean="0"/>
-              <a:t>25/10/2024</a:t>
+              <a:t>31/10/2024</a:t>
             </a:fld>
             <a:endParaRPr lang="en-GB"/>
           </a:p>
@@ -4502,7 +6177,7 @@
           <a:p>
             <a:fld id="{2A12C254-DF0A-4B2A-AFC6-8C5BFD04BE90}" type="datetimeFigureOut">
               <a:rPr lang="en-GB" smtClean="0"/>
-              <a:t>25/10/2024</a:t>
+              <a:t>31/10/2024</a:t>
             </a:fld>
             <a:endParaRPr lang="en-GB"/>
           </a:p>
@@ -5023,15 +6698,36 @@
             <p:ph type="title"/>
           </p:nvPr>
         </p:nvSpPr>
-        <p:spPr/>
+        <p:spPr>
+          <a:xfrm>
+            <a:off x="839788" y="365125"/>
+            <a:ext cx="10515600" cy="1628567"/>
+          </a:xfrm>
+        </p:spPr>
         <p:txBody>
           <a:bodyPr/>
           <a:lstStyle/>
           <a:p>
             <a:r>
-              <a:rPr lang="en-GB" dirty="0"/>
-              <a:t>Comparisons</a:t>
-            </a:r>
+              <a:rPr lang="en-GB" dirty="0">
+                <a:latin typeface="+mn-lt"/>
+              </a:rPr>
+              <a:t>My Comparisons</a:t>
+            </a:r>
+            <a:br>
+              <a:rPr lang="en-GB" dirty="0">
+                <a:latin typeface="+mn-lt"/>
+              </a:rPr>
+            </a:br>
+            <a:r>
+              <a:rPr lang="en-GB" sz="2000" dirty="0">
+                <a:latin typeface="+mn-lt"/>
+              </a:rPr>
+              <a:t>From this both my upload and downloads speeds do not come close to the national speeds.</a:t>
+            </a:r>
+            <a:endParaRPr lang="en-GB" dirty="0">
+              <a:latin typeface="+mn-lt"/>
+            </a:endParaRPr>
           </a:p>
         </p:txBody>
       </p:sp>
@@ -5309,15 +7005,38 @@
             <p:ph type="title"/>
           </p:nvPr>
         </p:nvSpPr>
-        <p:spPr/>
+        <p:spPr>
+          <a:xfrm>
+            <a:off x="839788" y="365125"/>
+            <a:ext cx="10515600" cy="1553616"/>
+          </a:xfrm>
+        </p:spPr>
         <p:txBody>
-          <a:bodyPr/>
+          <a:bodyPr>
+            <a:noAutofit/>
+          </a:bodyPr>
           <a:lstStyle/>
           <a:p>
             <a:r>
-              <a:rPr lang="en-GB" dirty="0"/>
-              <a:t>Comparisons</a:t>
-            </a:r>
+              <a:rPr lang="en-GB" sz="3200" dirty="0">
+                <a:latin typeface="+mn-lt"/>
+              </a:rPr>
+              <a:t>Group Comparisons</a:t>
+            </a:r>
+            <a:br>
+              <a:rPr lang="en-GB" sz="3200" dirty="0">
+                <a:latin typeface="+mn-lt"/>
+              </a:rPr>
+            </a:br>
+            <a:r>
+              <a:rPr lang="en-GB" sz="2400" dirty="0">
+                <a:latin typeface="+mn-lt"/>
+              </a:rPr>
+              <a:t>From this both the groups mean upload and downloads speeds do not come close to the national speeds, but the fastest download speeds was close to double the national average and the fastest upload speed was a little faster than the national average..</a:t>
+            </a:r>
+            <a:endParaRPr lang="en-GB" sz="3200" dirty="0">
+              <a:latin typeface="+mn-lt"/>
+            </a:endParaRPr>
           </a:p>
         </p:txBody>
       </p:sp>
@@ -5589,14 +7308,14 @@
             <p:ph idx="1"/>
             <p:extLst>
               <p:ext uri="{D42A27DB-BD31-4B8C-83A1-F6EECF244321}">
-                <p14:modId xmlns:p14="http://schemas.microsoft.com/office/powerpoint/2010/main" val="3446053921"/>
+                <p14:modId xmlns:p14="http://schemas.microsoft.com/office/powerpoint/2010/main" val="2140703368"/>
               </p:ext>
             </p:extLst>
           </p:nvPr>
         </p:nvGraphicFramePr>
         <p:xfrm>
           <a:off x="838200" y="716353"/>
-          <a:ext cx="10515600" cy="1381760"/>
+          <a:ext cx="10118440" cy="1381760"/>
         </p:xfrm>
         <a:graphic>
           <a:graphicData uri="http://schemas.openxmlformats.org/drawingml/2006/table">
@@ -5605,14 +7324,14 @@
                 <a:tableStyleId>{5C22544A-7EE6-4342-B048-85BDC9FD1C3A}</a:tableStyleId>
               </a:tblPr>
               <a:tblGrid>
-                <a:gridCol w="1314450">
+                <a:gridCol w="1163066">
                   <a:extLst>
                     <a:ext uri="{9D8B030D-6E8A-4147-A177-3AD203B41FA5}">
                       <a16:colId xmlns:a16="http://schemas.microsoft.com/office/drawing/2014/main" val="2860104804"/>
                     </a:ext>
                   </a:extLst>
                 </a:gridCol>
-                <a:gridCol w="1314450">
+                <a:gridCol w="1068674">
                   <a:extLst>
                     <a:ext uri="{9D8B030D-6E8A-4147-A177-3AD203B41FA5}">
                       <a16:colId xmlns:a16="http://schemas.microsoft.com/office/drawing/2014/main" val="2121806799"/>
@@ -5680,13 +7399,8 @@
                     <a:p>
                       <a:r>
                         <a:rPr lang="en-GB" dirty="0"/>
-                        <a:t>National </a:t>
+                        <a:t>National average</a:t>
                       </a:r>
-                      <a:r>
-                        <a:rPr lang="en-GB" dirty="0" err="1"/>
-                        <a:t>avg</a:t>
-                      </a:r>
-                      <a:endParaRPr lang="en-GB" dirty="0"/>
                     </a:p>
                   </a:txBody>
                   <a:tcPr/>
@@ -5698,13 +7412,8 @@
                     <a:p>
                       <a:r>
                         <a:rPr lang="en-GB" dirty="0"/>
-                        <a:t>My </a:t>
+                        <a:t>My average</a:t>
                       </a:r>
-                      <a:r>
-                        <a:rPr lang="en-GB" dirty="0" err="1"/>
-                        <a:t>avg</a:t>
-                      </a:r>
-                      <a:endParaRPr lang="en-GB" dirty="0"/>
                     </a:p>
                   </a:txBody>
                   <a:tcPr/>
@@ -5716,13 +7425,8 @@
                     <a:p>
                       <a:r>
                         <a:rPr lang="en-GB" dirty="0"/>
-                        <a:t>Group </a:t>
+                        <a:t>Group average</a:t>
                       </a:r>
-                      <a:r>
-                        <a:rPr lang="en-GB" dirty="0" err="1"/>
-                        <a:t>avg</a:t>
-                      </a:r>
-                      <a:endParaRPr lang="en-GB" dirty="0"/>
                     </a:p>
                   </a:txBody>
                   <a:tcPr/>
@@ -6032,18 +7736,46 @@
           <p:nvPr>
             <p:extLst>
               <p:ext uri="{D42A27DB-BD31-4B8C-83A1-F6EECF244321}">
-                <p14:modId xmlns:p14="http://schemas.microsoft.com/office/powerpoint/2010/main" val="2054813237"/>
+                <p14:modId xmlns:p14="http://schemas.microsoft.com/office/powerpoint/2010/main" val="3326170416"/>
               </p:ext>
             </p:extLst>
           </p:nvPr>
         </p:nvGraphicFramePr>
         <p:xfrm>
-          <a:off x="838200" y="2248526"/>
-          <a:ext cx="10515600" cy="4399474"/>
+          <a:off x="433466" y="2248526"/>
+          <a:ext cx="5577590" cy="4399474"/>
         </p:xfrm>
         <a:graphic>
           <a:graphicData uri="http://schemas.openxmlformats.org/drawingml/2006/chart">
             <c:chart xmlns:c="http://schemas.openxmlformats.org/drawingml/2006/chart" xmlns:r="http://schemas.openxmlformats.org/officeDocument/2006/relationships" r:id="rId2"/>
+          </a:graphicData>
+        </a:graphic>
+      </p:graphicFrame>
+      <p:graphicFrame>
+        <p:nvGraphicFramePr>
+          <p:cNvPr id="10" name="Chart 9">
+            <a:extLst>
+              <a:ext uri="{FF2B5EF4-FFF2-40B4-BE49-F238E27FC236}">
+                <a16:creationId xmlns:a16="http://schemas.microsoft.com/office/drawing/2014/main" id="{CCF4E268-3DAA-DA49-E311-8E67DCE4760D}"/>
+              </a:ext>
+            </a:extLst>
+          </p:cNvPr>
+          <p:cNvGraphicFramePr/>
+          <p:nvPr>
+            <p:extLst>
+              <p:ext uri="{D42A27DB-BD31-4B8C-83A1-F6EECF244321}">
+                <p14:modId xmlns:p14="http://schemas.microsoft.com/office/powerpoint/2010/main" val="2950789550"/>
+              </p:ext>
+            </p:extLst>
+          </p:nvPr>
+        </p:nvGraphicFramePr>
+        <p:xfrm>
+          <a:off x="6011056" y="2248526"/>
+          <a:ext cx="5577590" cy="4399474"/>
+        </p:xfrm>
+        <a:graphic>
+          <a:graphicData uri="http://schemas.openxmlformats.org/drawingml/2006/chart">
+            <c:chart xmlns:c="http://schemas.openxmlformats.org/drawingml/2006/chart" xmlns:r="http://schemas.openxmlformats.org/officeDocument/2006/relationships" r:id="rId3"/>
           </a:graphicData>
         </a:graphic>
       </p:graphicFrame>

</xml_diff>